<commit_message>
Add DataIntakeReport and make some adjustments to slides
</commit_message>
<xml_diff>
--- a/DataGlacierPresentation.pptx
+++ b/DataGlacierPresentation.pptx
@@ -6,14 +6,15 @@
   </p:sldMasterIdLst>
   <p:sldIdLst>
     <p:sldId id="279" r:id="rId2"/>
-    <p:sldId id="280" r:id="rId3"/>
-    <p:sldId id="281" r:id="rId4"/>
-    <p:sldId id="282" r:id="rId5"/>
-    <p:sldId id="283" r:id="rId6"/>
-    <p:sldId id="284" r:id="rId7"/>
-    <p:sldId id="285" r:id="rId8"/>
-    <p:sldId id="286" r:id="rId9"/>
-    <p:sldId id="287" r:id="rId10"/>
+    <p:sldId id="288" r:id="rId3"/>
+    <p:sldId id="280" r:id="rId4"/>
+    <p:sldId id="281" r:id="rId5"/>
+    <p:sldId id="282" r:id="rId6"/>
+    <p:sldId id="283" r:id="rId7"/>
+    <p:sldId id="284" r:id="rId8"/>
+    <p:sldId id="285" r:id="rId9"/>
+    <p:sldId id="286" r:id="rId10"/>
+    <p:sldId id="287" r:id="rId11"/>
   </p:sldIdLst>
   <p:sldSz cx="12192000" cy="6858000"/>
   <p:notesSz cx="6858000" cy="9144000"/>
@@ -267,7 +268,7 @@
           <a:p>
             <a:fld id="{6EECE964-F870-0E41-9FE5-38142943DD71}" type="datetimeFigureOut">
               <a:rPr lang="en-US" smtClean="0"/>
-              <a:t>7/20/2022</a:t>
+              <a:t>7/21/2022</a:t>
             </a:fld>
             <a:endParaRPr lang="en-US"/>
           </a:p>
@@ -465,7 +466,7 @@
           <a:p>
             <a:fld id="{6EECE964-F870-0E41-9FE5-38142943DD71}" type="datetimeFigureOut">
               <a:rPr lang="en-US" smtClean="0"/>
-              <a:t>7/20/2022</a:t>
+              <a:t>7/21/2022</a:t>
             </a:fld>
             <a:endParaRPr lang="en-US"/>
           </a:p>
@@ -673,7 +674,7 @@
           <a:p>
             <a:fld id="{6EECE964-F870-0E41-9FE5-38142943DD71}" type="datetimeFigureOut">
               <a:rPr lang="en-US" smtClean="0"/>
-              <a:t>7/20/2022</a:t>
+              <a:t>7/21/2022</a:t>
             </a:fld>
             <a:endParaRPr lang="en-US"/>
           </a:p>
@@ -871,7 +872,7 @@
           <a:p>
             <a:fld id="{6EECE964-F870-0E41-9FE5-38142943DD71}" type="datetimeFigureOut">
               <a:rPr lang="en-US" smtClean="0"/>
-              <a:t>7/20/2022</a:t>
+              <a:t>7/21/2022</a:t>
             </a:fld>
             <a:endParaRPr lang="en-US"/>
           </a:p>
@@ -1146,7 +1147,7 @@
           <a:p>
             <a:fld id="{6EECE964-F870-0E41-9FE5-38142943DD71}" type="datetimeFigureOut">
               <a:rPr lang="en-US" smtClean="0"/>
-              <a:t>7/20/2022</a:t>
+              <a:t>7/21/2022</a:t>
             </a:fld>
             <a:endParaRPr lang="en-US"/>
           </a:p>
@@ -1411,7 +1412,7 @@
           <a:p>
             <a:fld id="{6EECE964-F870-0E41-9FE5-38142943DD71}" type="datetimeFigureOut">
               <a:rPr lang="en-US" smtClean="0"/>
-              <a:t>7/20/2022</a:t>
+              <a:t>7/21/2022</a:t>
             </a:fld>
             <a:endParaRPr lang="en-US"/>
           </a:p>
@@ -1823,7 +1824,7 @@
           <a:p>
             <a:fld id="{6EECE964-F870-0E41-9FE5-38142943DD71}" type="datetimeFigureOut">
               <a:rPr lang="en-US" smtClean="0"/>
-              <a:t>7/20/2022</a:t>
+              <a:t>7/21/2022</a:t>
             </a:fld>
             <a:endParaRPr lang="en-US"/>
           </a:p>
@@ -1964,7 +1965,7 @@
           <a:p>
             <a:fld id="{6EECE964-F870-0E41-9FE5-38142943DD71}" type="datetimeFigureOut">
               <a:rPr lang="en-US" smtClean="0"/>
-              <a:t>7/20/2022</a:t>
+              <a:t>7/21/2022</a:t>
             </a:fld>
             <a:endParaRPr lang="en-US"/>
           </a:p>
@@ -2077,7 +2078,7 @@
           <a:p>
             <a:fld id="{6EECE964-F870-0E41-9FE5-38142943DD71}" type="datetimeFigureOut">
               <a:rPr lang="en-US" smtClean="0"/>
-              <a:t>7/20/2022</a:t>
+              <a:t>7/21/2022</a:t>
             </a:fld>
             <a:endParaRPr lang="en-US"/>
           </a:p>
@@ -2388,7 +2389,7 @@
           <a:p>
             <a:fld id="{6EECE964-F870-0E41-9FE5-38142943DD71}" type="datetimeFigureOut">
               <a:rPr lang="en-US" smtClean="0"/>
-              <a:t>7/20/2022</a:t>
+              <a:t>7/21/2022</a:t>
             </a:fld>
             <a:endParaRPr lang="en-US"/>
           </a:p>
@@ -2676,7 +2677,7 @@
           <a:p>
             <a:fld id="{6EECE964-F870-0E41-9FE5-38142943DD71}" type="datetimeFigureOut">
               <a:rPr lang="en-US" smtClean="0"/>
-              <a:t>7/20/2022</a:t>
+              <a:t>7/21/2022</a:t>
             </a:fld>
             <a:endParaRPr lang="en-US"/>
           </a:p>
@@ -2917,7 +2918,7 @@
           <a:p>
             <a:fld id="{6EECE964-F870-0E41-9FE5-38142943DD71}" type="datetimeFigureOut">
               <a:rPr lang="en-US" smtClean="0"/>
-              <a:t>7/20/2022</a:t>
+              <a:t>7/21/2022</a:t>
             </a:fld>
             <a:endParaRPr lang="en-US"/>
           </a:p>
@@ -3601,7 +3602,7 @@
 </p:sld>
 </file>
 
-<file path=ppt/slides/slide2.xml><?xml version="1.0" encoding="utf-8"?>
+<file path=ppt/slides/slide10.xml><?xml version="1.0" encoding="utf-8"?>
 <p:sld xmlns:a="http://schemas.openxmlformats.org/drawingml/2006/main" xmlns:r="http://schemas.openxmlformats.org/officeDocument/2006/relationships" xmlns:p="http://schemas.openxmlformats.org/presentationml/2006/main">
   <p:cSld>
     <p:spTree>
@@ -3618,64 +3619,6 @@
           <a:chExt cx="0" cy="0"/>
         </a:xfrm>
       </p:grpSpPr>
-      <p:sp>
-        <p:nvSpPr>
-          <p:cNvPr id="3" name="Content Placeholder 2">
-            <a:extLst>
-              <a:ext uri="{FF2B5EF4-FFF2-40B4-BE49-F238E27FC236}">
-                <a16:creationId xmlns:a16="http://schemas.microsoft.com/office/drawing/2014/main" id="{82C5C5A3-2E84-0849-82EA-36D2326D3784}"/>
-              </a:ext>
-            </a:extLst>
-          </p:cNvPr>
-          <p:cNvSpPr>
-            <a:spLocks noGrp="1"/>
-          </p:cNvSpPr>
-          <p:nvPr>
-            <p:ph idx="1"/>
-          </p:nvPr>
-        </p:nvSpPr>
-        <p:spPr>
-          <a:xfrm>
-            <a:off x="762000" y="1812608"/>
-            <a:ext cx="10515600" cy="4351338"/>
-          </a:xfrm>
-        </p:spPr>
-        <p:txBody>
-          <a:bodyPr>
-            <a:normAutofit/>
-          </a:bodyPr>
-          <a:lstStyle/>
-          <a:p>
-            <a:r>
-              <a:rPr lang="en-US" sz="1800" dirty="0"/>
-              <a:t>359392 rows of transaction data available after the four datasets are merged</a:t>
-            </a:r>
-          </a:p>
-          <a:p>
-            <a:r>
-              <a:rPr lang="en-US" sz="1800" dirty="0"/>
-              <a:t>Dates of travel range from 2016-1-4 to 2019-1-2 (set base to 1900-01-01)</a:t>
-            </a:r>
-          </a:p>
-          <a:p>
-            <a:r>
-              <a:rPr lang="en-US" sz="1800" dirty="0"/>
-              <a:t>Columns after the initial merging: Transaction ID, Date of Travel, Company, City, KM Travelled, Price Charged, Cost of Trip, Customer ID, </a:t>
-            </a:r>
-            <a:r>
-              <a:rPr lang="en-US" sz="1800" dirty="0" err="1"/>
-              <a:t>Payment_Mode</a:t>
-            </a:r>
-            <a:r>
-              <a:rPr lang="en-US" sz="1800" dirty="0"/>
-              <a:t>, Gender, Age, Income, Population, Users</a:t>
-            </a:r>
-          </a:p>
-          <a:p>
-            <a:endParaRPr lang="en-US" sz="1800" dirty="0"/>
-          </a:p>
-        </p:txBody>
-      </p:sp>
       <p:sp>
         <p:nvSpPr>
           <p:cNvPr id="4" name="Rectangle 3">
@@ -3792,7 +3735,43 @@
                 <a:latin typeface="Calibri" panose="020F0502020204030204" pitchFamily="34" charset="0"/>
                 <a:cs typeface="Calibri" panose="020F0502020204030204" pitchFamily="34" charset="0"/>
               </a:rPr>
-              <a:t>Data summary</a:t>
+              <a:t>Recommendations</a:t>
+            </a:r>
+          </a:p>
+        </p:txBody>
+      </p:sp>
+      <p:sp>
+        <p:nvSpPr>
+          <p:cNvPr id="7" name="内容占位符 6">
+            <a:extLst>
+              <a:ext uri="{FF2B5EF4-FFF2-40B4-BE49-F238E27FC236}">
+                <a16:creationId xmlns:a16="http://schemas.microsoft.com/office/drawing/2014/main" id="{11427BD2-B1D6-D66C-39A4-831B30B1BD2C}"/>
+              </a:ext>
+            </a:extLst>
+          </p:cNvPr>
+          <p:cNvSpPr>
+            <a:spLocks noGrp="1"/>
+          </p:cNvSpPr>
+          <p:nvPr>
+            <p:ph idx="1"/>
+          </p:nvPr>
+        </p:nvSpPr>
+        <p:spPr/>
+        <p:txBody>
+          <a:bodyPr>
+            <a:normAutofit/>
+          </a:bodyPr>
+          <a:lstStyle/>
+          <a:p>
+            <a:r>
+              <a:rPr lang="en-US" altLang="zh-CN" sz="2400" dirty="0"/>
+              <a:t>From the analysis in previous slides we can see that Yellow Cab performs better in every way. It had more transaction number, generated more profit per km, and was more popular among all age groups.</a:t>
+            </a:r>
+          </a:p>
+          <a:p>
+            <a:r>
+              <a:rPr lang="en-US" altLang="zh-CN" sz="2400" dirty="0"/>
+              <a:t>Therefore, we recommend Yellow Cab for investment.</a:t>
             </a:r>
           </a:p>
         </p:txBody>
@@ -3800,7 +3779,7 @@
     </p:spTree>
     <p:extLst>
       <p:ext uri="{BB962C8B-B14F-4D97-AF65-F5344CB8AC3E}">
-        <p14:creationId xmlns:p14="http://schemas.microsoft.com/office/powerpoint/2010/main" val="3504532453"/>
+        <p14:creationId xmlns:p14="http://schemas.microsoft.com/office/powerpoint/2010/main" val="3930029949"/>
       </p:ext>
     </p:extLst>
   </p:cSld>
@@ -3810,7 +3789,7 @@
 </p:sld>
 </file>
 
-<file path=ppt/slides/slide3.xml><?xml version="1.0" encoding="utf-8"?>
+<file path=ppt/slides/slide2.xml><?xml version="1.0" encoding="utf-8"?>
 <p:sld xmlns:a="http://schemas.openxmlformats.org/drawingml/2006/main" xmlns:r="http://schemas.openxmlformats.org/officeDocument/2006/relationships" xmlns:p="http://schemas.openxmlformats.org/presentationml/2006/main">
   <p:cSld>
     <p:spTree>
@@ -3827,41 +3806,47 @@
           <a:chExt cx="0" cy="0"/>
         </a:xfrm>
       </p:grpSpPr>
-      <p:pic>
-        <p:nvPicPr>
-          <p:cNvPr id="5" name="内容占位符 4">
-            <a:extLst>
-              <a:ext uri="{FF2B5EF4-FFF2-40B4-BE49-F238E27FC236}">
-                <a16:creationId xmlns:a16="http://schemas.microsoft.com/office/drawing/2014/main" id="{1FC8390D-1A02-FCFD-D9B4-56FB6DCFE9BA}"/>
-              </a:ext>
-            </a:extLst>
-          </p:cNvPr>
-          <p:cNvPicPr>
-            <a:picLocks noGrp="1" noChangeAspect="1"/>
-          </p:cNvPicPr>
+      <p:sp>
+        <p:nvSpPr>
+          <p:cNvPr id="3" name="Content Placeholder 2">
+            <a:extLst>
+              <a:ext uri="{FF2B5EF4-FFF2-40B4-BE49-F238E27FC236}">
+                <a16:creationId xmlns:a16="http://schemas.microsoft.com/office/drawing/2014/main" id="{82C5C5A3-2E84-0849-82EA-36D2326D3784}"/>
+              </a:ext>
+            </a:extLst>
+          </p:cNvPr>
+          <p:cNvSpPr>
+            <a:spLocks noGrp="1"/>
+          </p:cNvSpPr>
           <p:nvPr>
             <p:ph idx="1"/>
           </p:nvPr>
-        </p:nvPicPr>
-        <p:blipFill>
-          <a:blip r:embed="rId2">
-            <a:extLst>
-              <a:ext uri="{28A0092B-C50C-407E-A947-70E740481C1C}">
-                <a14:useLocalDpi xmlns:a14="http://schemas.microsoft.com/office/drawing/2010/main" val="0"/>
-              </a:ext>
-            </a:extLst>
-          </a:blip>
-          <a:stretch>
-            <a:fillRect/>
-          </a:stretch>
-        </p:blipFill>
+        </p:nvSpPr>
         <p:spPr>
           <a:xfrm>
-            <a:off x="838200" y="2228428"/>
-            <a:ext cx="5003174" cy="3352381"/>
+            <a:off x="762000" y="1812608"/>
+            <a:ext cx="10515600" cy="4351338"/>
           </a:xfrm>
         </p:spPr>
-      </p:pic>
+        <p:txBody>
+          <a:bodyPr>
+            <a:normAutofit/>
+          </a:bodyPr>
+          <a:lstStyle/>
+          <a:p>
+            <a:r>
+              <a:rPr lang="en-US" sz="2000" dirty="0"/>
+              <a:t>XYZ is a private firm in US. Due to remarkable growth in the Cab Industry in last few years and multiple key players in the market, it is planning for an investment in Cab industry and as per their Go-to-Market(G2M) strategy they want to understand the market before taking final decision.</a:t>
+            </a:r>
+          </a:p>
+          <a:p>
+            <a:r>
+              <a:rPr lang="en-US" sz="2000" dirty="0"/>
+              <a:t>Objective: Help XYZ firm identify the right company to invest</a:t>
+            </a:r>
+          </a:p>
+        </p:txBody>
+      </p:sp>
       <p:sp>
         <p:nvSpPr>
           <p:cNvPr id="4" name="Rectangle 3">
@@ -3978,51 +3963,15 @@
                 <a:latin typeface="Calibri" panose="020F0502020204030204" pitchFamily="34" charset="0"/>
                 <a:cs typeface="Calibri" panose="020F0502020204030204" pitchFamily="34" charset="0"/>
               </a:rPr>
-              <a:t>Transaction number for each company</a:t>
-            </a:r>
-          </a:p>
-        </p:txBody>
-      </p:sp>
-      <p:sp>
-        <p:nvSpPr>
-          <p:cNvPr id="7" name="文本框 6">
-            <a:extLst>
-              <a:ext uri="{FF2B5EF4-FFF2-40B4-BE49-F238E27FC236}">
-                <a16:creationId xmlns:a16="http://schemas.microsoft.com/office/drawing/2014/main" id="{94CC194D-52E6-B624-B168-03DD8E5B3613}"/>
-              </a:ext>
-            </a:extLst>
-          </p:cNvPr>
-          <p:cNvSpPr txBox="1"/>
-          <p:nvPr/>
-        </p:nvSpPr>
-        <p:spPr>
-          <a:xfrm>
-            <a:off x="6410527" y="2582295"/>
-            <a:ext cx="4643962" cy="1015663"/>
-          </a:xfrm>
-          <a:prstGeom prst="rect">
-            <a:avLst/>
-          </a:prstGeom>
-          <a:noFill/>
-        </p:spPr>
-        <p:txBody>
-          <a:bodyPr wrap="square" rtlCol="0">
-            <a:spAutoFit/>
-          </a:bodyPr>
-          <a:lstStyle/>
-          <a:p>
-            <a:r>
-              <a:rPr lang="en-US" altLang="zh-CN" sz="2000" dirty="0"/>
-              <a:t>From the plot we can see that Yellow Cab company has much larger transaction number during this period. </a:t>
-            </a:r>
-            <a:endParaRPr lang="zh-CN" altLang="en-US" sz="2000" dirty="0"/>
+              <a:t>Background</a:t>
+            </a:r>
           </a:p>
         </p:txBody>
       </p:sp>
     </p:spTree>
     <p:extLst>
       <p:ext uri="{BB962C8B-B14F-4D97-AF65-F5344CB8AC3E}">
-        <p14:creationId xmlns:p14="http://schemas.microsoft.com/office/powerpoint/2010/main" val="104990407"/>
+        <p14:creationId xmlns:p14="http://schemas.microsoft.com/office/powerpoint/2010/main" val="241776091"/>
       </p:ext>
     </p:extLst>
   </p:cSld>
@@ -4032,7 +3981,7 @@
 </p:sld>
 </file>
 
-<file path=ppt/slides/slide4.xml><?xml version="1.0" encoding="utf-8"?>
+<file path=ppt/slides/slide3.xml><?xml version="1.0" encoding="utf-8"?>
 <p:sld xmlns:a="http://schemas.openxmlformats.org/drawingml/2006/main" xmlns:r="http://schemas.openxmlformats.org/officeDocument/2006/relationships" xmlns:p="http://schemas.openxmlformats.org/presentationml/2006/main">
   <p:cSld>
     <p:spTree>
@@ -4049,6 +3998,64 @@
           <a:chExt cx="0" cy="0"/>
         </a:xfrm>
       </p:grpSpPr>
+      <p:sp>
+        <p:nvSpPr>
+          <p:cNvPr id="3" name="Content Placeholder 2">
+            <a:extLst>
+              <a:ext uri="{FF2B5EF4-FFF2-40B4-BE49-F238E27FC236}">
+                <a16:creationId xmlns:a16="http://schemas.microsoft.com/office/drawing/2014/main" id="{82C5C5A3-2E84-0849-82EA-36D2326D3784}"/>
+              </a:ext>
+            </a:extLst>
+          </p:cNvPr>
+          <p:cNvSpPr>
+            <a:spLocks noGrp="1"/>
+          </p:cNvSpPr>
+          <p:nvPr>
+            <p:ph idx="1"/>
+          </p:nvPr>
+        </p:nvSpPr>
+        <p:spPr>
+          <a:xfrm>
+            <a:off x="762000" y="1812608"/>
+            <a:ext cx="10515600" cy="4351338"/>
+          </a:xfrm>
+        </p:spPr>
+        <p:txBody>
+          <a:bodyPr>
+            <a:normAutofit/>
+          </a:bodyPr>
+          <a:lstStyle/>
+          <a:p>
+            <a:r>
+              <a:rPr lang="en-US" sz="2000" dirty="0"/>
+              <a:t>359392 rows of transaction data available after the four datasets are merged</a:t>
+            </a:r>
+          </a:p>
+          <a:p>
+            <a:r>
+              <a:rPr lang="en-US" sz="2000" dirty="0"/>
+              <a:t>Dates of travel range from 2016-1-4 to 2019-1-2 (set base to 1900-01-01)</a:t>
+            </a:r>
+          </a:p>
+          <a:p>
+            <a:r>
+              <a:rPr lang="en-US" sz="2000" dirty="0"/>
+              <a:t>Columns after the initial merging: Transaction ID, Date of Travel, Company, City, KM Travelled, Price Charged, Cost of Trip, Customer ID, </a:t>
+            </a:r>
+            <a:r>
+              <a:rPr lang="en-US" sz="2000" dirty="0" err="1"/>
+              <a:t>Payment_Mode</a:t>
+            </a:r>
+            <a:r>
+              <a:rPr lang="en-US" sz="2000" dirty="0"/>
+              <a:t>, Gender, Age, Income, Population, Users</a:t>
+            </a:r>
+          </a:p>
+          <a:p>
+            <a:endParaRPr lang="en-US" sz="2000" dirty="0"/>
+          </a:p>
+        </p:txBody>
+      </p:sp>
       <p:sp>
         <p:nvSpPr>
           <p:cNvPr id="4" name="Rectangle 3">
@@ -4165,86 +4172,15 @@
                 <a:latin typeface="Calibri" panose="020F0502020204030204" pitchFamily="34" charset="0"/>
                 <a:cs typeface="Calibri" panose="020F0502020204030204" pitchFamily="34" charset="0"/>
               </a:rPr>
-              <a:t>Revenue of each company</a:t>
-            </a:r>
-          </a:p>
-        </p:txBody>
-      </p:sp>
-      <p:pic>
-        <p:nvPicPr>
-          <p:cNvPr id="9" name="内容占位符 8">
-            <a:extLst>
-              <a:ext uri="{FF2B5EF4-FFF2-40B4-BE49-F238E27FC236}">
-                <a16:creationId xmlns:a16="http://schemas.microsoft.com/office/drawing/2014/main" id="{9E394480-EA1D-9B48-544F-2BB96C56CA3C}"/>
-              </a:ext>
-            </a:extLst>
-          </p:cNvPr>
-          <p:cNvPicPr>
-            <a:picLocks noGrp="1" noChangeAspect="1"/>
-          </p:cNvPicPr>
-          <p:nvPr>
-            <p:ph idx="1"/>
-          </p:nvPr>
-        </p:nvPicPr>
-        <p:blipFill>
-          <a:blip r:embed="rId2">
-            <a:extLst>
-              <a:ext uri="{28A0092B-C50C-407E-A947-70E740481C1C}">
-                <a14:useLocalDpi xmlns:a14="http://schemas.microsoft.com/office/drawing/2010/main" val="0"/>
-              </a:ext>
-            </a:extLst>
-          </a:blip>
-          <a:stretch>
-            <a:fillRect/>
-          </a:stretch>
-        </p:blipFill>
-        <p:spPr>
-          <a:xfrm>
-            <a:off x="838200" y="2310859"/>
-            <a:ext cx="4850793" cy="3530159"/>
-          </a:xfrm>
-        </p:spPr>
-      </p:pic>
-      <p:sp>
-        <p:nvSpPr>
-          <p:cNvPr id="10" name="文本框 9">
-            <a:extLst>
-              <a:ext uri="{FF2B5EF4-FFF2-40B4-BE49-F238E27FC236}">
-                <a16:creationId xmlns:a16="http://schemas.microsoft.com/office/drawing/2014/main" id="{422A5FCF-764B-2E43-D1FD-16E00D91B6D1}"/>
-              </a:ext>
-            </a:extLst>
-          </p:cNvPr>
-          <p:cNvSpPr txBox="1"/>
-          <p:nvPr/>
-        </p:nvSpPr>
-        <p:spPr>
-          <a:xfrm>
-            <a:off x="6643397" y="2875609"/>
-            <a:ext cx="4217437" cy="1200329"/>
-          </a:xfrm>
-          <a:prstGeom prst="rect">
-            <a:avLst/>
-          </a:prstGeom>
-          <a:noFill/>
-        </p:spPr>
-        <p:txBody>
-          <a:bodyPr wrap="square" rtlCol="0">
-            <a:spAutoFit/>
-          </a:bodyPr>
-          <a:lstStyle/>
-          <a:p>
-            <a:r>
-              <a:rPr lang="en-US" altLang="zh-CN" dirty="0"/>
-              <a:t>From the plot we can see that Yellow Cab company performs better in terms of total revenue, which is calculated by adding all price charged.</a:t>
-            </a:r>
-            <a:endParaRPr lang="zh-CN" altLang="en-US" dirty="0"/>
+              <a:t>Data summary</a:t>
+            </a:r>
           </a:p>
         </p:txBody>
       </p:sp>
     </p:spTree>
     <p:extLst>
       <p:ext uri="{BB962C8B-B14F-4D97-AF65-F5344CB8AC3E}">
-        <p14:creationId xmlns:p14="http://schemas.microsoft.com/office/powerpoint/2010/main" val="2778884392"/>
+        <p14:creationId xmlns:p14="http://schemas.microsoft.com/office/powerpoint/2010/main" val="3504532453"/>
       </p:ext>
     </p:extLst>
   </p:cSld>
@@ -4254,7 +4190,7 @@
 </p:sld>
 </file>
 
-<file path=ppt/slides/slide5.xml><?xml version="1.0" encoding="utf-8"?>
+<file path=ppt/slides/slide4.xml><?xml version="1.0" encoding="utf-8"?>
 <p:sld xmlns:a="http://schemas.openxmlformats.org/drawingml/2006/main" xmlns:r="http://schemas.openxmlformats.org/officeDocument/2006/relationships" xmlns:p="http://schemas.openxmlformats.org/presentationml/2006/main">
   <p:cSld>
     <p:spTree>
@@ -4271,6 +4207,41 @@
           <a:chExt cx="0" cy="0"/>
         </a:xfrm>
       </p:grpSpPr>
+      <p:pic>
+        <p:nvPicPr>
+          <p:cNvPr id="5" name="内容占位符 4">
+            <a:extLst>
+              <a:ext uri="{FF2B5EF4-FFF2-40B4-BE49-F238E27FC236}">
+                <a16:creationId xmlns:a16="http://schemas.microsoft.com/office/drawing/2014/main" id="{1FC8390D-1A02-FCFD-D9B4-56FB6DCFE9BA}"/>
+              </a:ext>
+            </a:extLst>
+          </p:cNvPr>
+          <p:cNvPicPr>
+            <a:picLocks noGrp="1" noChangeAspect="1"/>
+          </p:cNvPicPr>
+          <p:nvPr>
+            <p:ph idx="1"/>
+          </p:nvPr>
+        </p:nvPicPr>
+        <p:blipFill>
+          <a:blip r:embed="rId2">
+            <a:extLst>
+              <a:ext uri="{28A0092B-C50C-407E-A947-70E740481C1C}">
+                <a14:useLocalDpi xmlns:a14="http://schemas.microsoft.com/office/drawing/2010/main" val="0"/>
+              </a:ext>
+            </a:extLst>
+          </a:blip>
+          <a:stretch>
+            <a:fillRect/>
+          </a:stretch>
+        </p:blipFill>
+        <p:spPr>
+          <a:xfrm>
+            <a:off x="838200" y="2228428"/>
+            <a:ext cx="5003174" cy="3352381"/>
+          </a:xfrm>
+        </p:spPr>
+      </p:pic>
       <p:sp>
         <p:nvSpPr>
           <p:cNvPr id="4" name="Rectangle 3">
@@ -4387,62 +4358,27 @@
                 <a:latin typeface="Calibri" panose="020F0502020204030204" pitchFamily="34" charset="0"/>
                 <a:cs typeface="Calibri" panose="020F0502020204030204" pitchFamily="34" charset="0"/>
               </a:rPr>
-              <a:t>Average profit per km</a:t>
-            </a:r>
-          </a:p>
-        </p:txBody>
-      </p:sp>
-      <p:pic>
-        <p:nvPicPr>
-          <p:cNvPr id="7" name="内容占位符 6">
-            <a:extLst>
-              <a:ext uri="{FF2B5EF4-FFF2-40B4-BE49-F238E27FC236}">
-                <a16:creationId xmlns:a16="http://schemas.microsoft.com/office/drawing/2014/main" id="{429D0622-8F01-7C60-0080-8943C7AABDD7}"/>
-              </a:ext>
-            </a:extLst>
-          </p:cNvPr>
-          <p:cNvPicPr>
-            <a:picLocks noGrp="1" noChangeAspect="1"/>
-          </p:cNvPicPr>
-          <p:nvPr>
-            <p:ph idx="1"/>
-          </p:nvPr>
-        </p:nvPicPr>
-        <p:blipFill>
-          <a:blip r:embed="rId2">
-            <a:extLst>
-              <a:ext uri="{28A0092B-C50C-407E-A947-70E740481C1C}">
-                <a14:useLocalDpi xmlns:a14="http://schemas.microsoft.com/office/drawing/2010/main" val="0"/>
-              </a:ext>
-            </a:extLst>
-          </a:blip>
-          <a:stretch>
-            <a:fillRect/>
-          </a:stretch>
-        </p:blipFill>
+              <a:t>Transaction number for each company</a:t>
+            </a:r>
+          </a:p>
+        </p:txBody>
+      </p:sp>
+      <p:sp>
+        <p:nvSpPr>
+          <p:cNvPr id="7" name="文本框 6">
+            <a:extLst>
+              <a:ext uri="{FF2B5EF4-FFF2-40B4-BE49-F238E27FC236}">
+                <a16:creationId xmlns:a16="http://schemas.microsoft.com/office/drawing/2014/main" id="{94CC194D-52E6-B624-B168-03DD8E5B3613}"/>
+              </a:ext>
+            </a:extLst>
+          </p:cNvPr>
+          <p:cNvSpPr txBox="1"/>
+          <p:nvPr/>
+        </p:nvSpPr>
         <p:spPr>
           <a:xfrm>
-            <a:off x="838200" y="2310858"/>
-            <a:ext cx="4774603" cy="3530159"/>
-          </a:xfrm>
-        </p:spPr>
-      </p:pic>
-      <p:sp>
-        <p:nvSpPr>
-          <p:cNvPr id="11" name="文本框 10">
-            <a:extLst>
-              <a:ext uri="{FF2B5EF4-FFF2-40B4-BE49-F238E27FC236}">
-                <a16:creationId xmlns:a16="http://schemas.microsoft.com/office/drawing/2014/main" id="{65A0D1DC-DCA4-1C64-B38A-5D0CFD2D3750}"/>
-              </a:ext>
-            </a:extLst>
-          </p:cNvPr>
-          <p:cNvSpPr txBox="1"/>
-          <p:nvPr/>
-        </p:nvSpPr>
-        <p:spPr>
-          <a:xfrm>
-            <a:off x="6391072" y="2684834"/>
-            <a:ext cx="4961107" cy="1200329"/>
+            <a:off x="6410527" y="2582295"/>
+            <a:ext cx="4643962" cy="1015663"/>
           </a:xfrm>
           <a:prstGeom prst="rect">
             <a:avLst/>
@@ -4456,17 +4392,17 @@
           <a:lstStyle/>
           <a:p>
             <a:r>
-              <a:rPr lang="en-US" altLang="zh-CN" dirty="0"/>
-              <a:t>Yellow Cab performs better in terms of average profit per km. This means that Yellow Cab has better cost management mechanism and thus greater capability to generate profit.</a:t>
-            </a:r>
-            <a:endParaRPr lang="zh-CN" altLang="en-US" dirty="0"/>
+              <a:rPr lang="en-US" altLang="zh-CN" sz="2000" dirty="0"/>
+              <a:t>From the plot we can see that Yellow Cab company has much larger transaction number during this period. </a:t>
+            </a:r>
+            <a:endParaRPr lang="zh-CN" altLang="en-US" sz="2000" dirty="0"/>
           </a:p>
         </p:txBody>
       </p:sp>
     </p:spTree>
     <p:extLst>
       <p:ext uri="{BB962C8B-B14F-4D97-AF65-F5344CB8AC3E}">
-        <p14:creationId xmlns:p14="http://schemas.microsoft.com/office/powerpoint/2010/main" val="1746344433"/>
+        <p14:creationId xmlns:p14="http://schemas.microsoft.com/office/powerpoint/2010/main" val="104990407"/>
       </p:ext>
     </p:extLst>
   </p:cSld>
@@ -4476,7 +4412,7 @@
 </p:sld>
 </file>
 
-<file path=ppt/slides/slide6.xml><?xml version="1.0" encoding="utf-8"?>
+<file path=ppt/slides/slide5.xml><?xml version="1.0" encoding="utf-8"?>
 <p:sld xmlns:a="http://schemas.openxmlformats.org/drawingml/2006/main" xmlns:r="http://schemas.openxmlformats.org/officeDocument/2006/relationships" xmlns:p="http://schemas.openxmlformats.org/presentationml/2006/main">
   <p:cSld>
     <p:spTree>
@@ -4609,17 +4545,17 @@
                 <a:latin typeface="Calibri" panose="020F0502020204030204" pitchFamily="34" charset="0"/>
                 <a:cs typeface="Calibri" panose="020F0502020204030204" pitchFamily="34" charset="0"/>
               </a:rPr>
-              <a:t>User-City Table</a:t>
+              <a:t>Revenue of each company</a:t>
             </a:r>
           </a:p>
         </p:txBody>
       </p:sp>
       <p:pic>
         <p:nvPicPr>
-          <p:cNvPr id="8" name="内容占位符 7">
-            <a:extLst>
-              <a:ext uri="{FF2B5EF4-FFF2-40B4-BE49-F238E27FC236}">
-                <a16:creationId xmlns:a16="http://schemas.microsoft.com/office/drawing/2014/main" id="{0CF328B9-776D-FA58-1739-45D8F7CD079B}"/>
+          <p:cNvPr id="9" name="内容占位符 8">
+            <a:extLst>
+              <a:ext uri="{FF2B5EF4-FFF2-40B4-BE49-F238E27FC236}">
+                <a16:creationId xmlns:a16="http://schemas.microsoft.com/office/drawing/2014/main" id="{9E394480-EA1D-9B48-544F-2BB96C56CA3C}"/>
               </a:ext>
             </a:extLst>
           </p:cNvPr>
@@ -4644,17 +4580,17 @@
         </p:blipFill>
         <p:spPr>
           <a:xfrm>
-            <a:off x="409139" y="1524686"/>
-            <a:ext cx="5593555" cy="5128041"/>
+            <a:off x="838200" y="2310859"/>
+            <a:ext cx="4850793" cy="3530159"/>
           </a:xfrm>
         </p:spPr>
       </p:pic>
       <p:sp>
         <p:nvSpPr>
-          <p:cNvPr id="12" name="文本框 11">
-            <a:extLst>
-              <a:ext uri="{FF2B5EF4-FFF2-40B4-BE49-F238E27FC236}">
-                <a16:creationId xmlns:a16="http://schemas.microsoft.com/office/drawing/2014/main" id="{8CF08BC7-943B-3172-FA62-62BD0EABA6EC}"/>
+          <p:cNvPr id="10" name="文本框 9">
+            <a:extLst>
+              <a:ext uri="{FF2B5EF4-FFF2-40B4-BE49-F238E27FC236}">
+                <a16:creationId xmlns:a16="http://schemas.microsoft.com/office/drawing/2014/main" id="{422A5FCF-764B-2E43-D1FD-16E00D91B6D1}"/>
               </a:ext>
             </a:extLst>
           </p:cNvPr>
@@ -4663,8 +4599,8 @@
         </p:nvSpPr>
         <p:spPr>
           <a:xfrm>
-            <a:off x="6096000" y="2577830"/>
-            <a:ext cx="4798979" cy="1477328"/>
+            <a:off x="6643397" y="2875609"/>
+            <a:ext cx="4217437" cy="1200329"/>
           </a:xfrm>
           <a:prstGeom prst="rect">
             <a:avLst/>
@@ -4679,7 +4615,7 @@
           <a:p>
             <a:r>
               <a:rPr lang="en-US" altLang="zh-CN" dirty="0"/>
-              <a:t>“Users” column is interpreted as the total number of cab users in the corresponding city. From the table we can see that both companies only account for a small portion of users in the cities. </a:t>
+              <a:t>From the plot we can see that Yellow Cab company performs better in terms of total revenue, which is calculated by adding all price charged.</a:t>
             </a:r>
             <a:endParaRPr lang="zh-CN" altLang="en-US" dirty="0"/>
           </a:p>
@@ -4688,7 +4624,7 @@
     </p:spTree>
     <p:extLst>
       <p:ext uri="{BB962C8B-B14F-4D97-AF65-F5344CB8AC3E}">
-        <p14:creationId xmlns:p14="http://schemas.microsoft.com/office/powerpoint/2010/main" val="3170667158"/>
+        <p14:creationId xmlns:p14="http://schemas.microsoft.com/office/powerpoint/2010/main" val="2778884392"/>
       </p:ext>
     </p:extLst>
   </p:cSld>
@@ -4698,7 +4634,7 @@
 </p:sld>
 </file>
 
-<file path=ppt/slides/slide7.xml><?xml version="1.0" encoding="utf-8"?>
+<file path=ppt/slides/slide6.xml><?xml version="1.0" encoding="utf-8"?>
 <p:sld xmlns:a="http://schemas.openxmlformats.org/drawingml/2006/main" xmlns:r="http://schemas.openxmlformats.org/officeDocument/2006/relationships" xmlns:p="http://schemas.openxmlformats.org/presentationml/2006/main">
   <p:cSld>
     <p:spTree>
@@ -4831,7 +4767,7 @@
                 <a:latin typeface="Calibri" panose="020F0502020204030204" pitchFamily="34" charset="0"/>
                 <a:cs typeface="Calibri" panose="020F0502020204030204" pitchFamily="34" charset="0"/>
               </a:rPr>
-              <a:t>Transaction number in different age groups</a:t>
+              <a:t>Average profit per km</a:t>
             </a:r>
           </a:p>
         </p:txBody>
@@ -4841,7 +4777,7 @@
           <p:cNvPr id="7" name="内容占位符 6">
             <a:extLst>
               <a:ext uri="{FF2B5EF4-FFF2-40B4-BE49-F238E27FC236}">
-                <a16:creationId xmlns:a16="http://schemas.microsoft.com/office/drawing/2014/main" id="{2506A8E8-390B-40CA-C7EB-C6D7175A3488}"/>
+                <a16:creationId xmlns:a16="http://schemas.microsoft.com/office/drawing/2014/main" id="{429D0622-8F01-7C60-0080-8943C7AABDD7}"/>
               </a:ext>
             </a:extLst>
           </p:cNvPr>
@@ -4866,17 +4802,17 @@
         </p:blipFill>
         <p:spPr>
           <a:xfrm>
-            <a:off x="838200" y="2478810"/>
-            <a:ext cx="5180952" cy="3530159"/>
+            <a:off x="838200" y="2310858"/>
+            <a:ext cx="4774603" cy="3530159"/>
           </a:xfrm>
         </p:spPr>
       </p:pic>
       <p:sp>
         <p:nvSpPr>
-          <p:cNvPr id="10" name="文本框 9">
-            <a:extLst>
-              <a:ext uri="{FF2B5EF4-FFF2-40B4-BE49-F238E27FC236}">
-                <a16:creationId xmlns:a16="http://schemas.microsoft.com/office/drawing/2014/main" id="{E25505AA-9800-6C4C-F213-CB2C53807E06}"/>
+          <p:cNvPr id="11" name="文本框 10">
+            <a:extLst>
+              <a:ext uri="{FF2B5EF4-FFF2-40B4-BE49-F238E27FC236}">
+                <a16:creationId xmlns:a16="http://schemas.microsoft.com/office/drawing/2014/main" id="{65A0D1DC-DCA4-1C64-B38A-5D0CFD2D3750}"/>
               </a:ext>
             </a:extLst>
           </p:cNvPr>
@@ -4885,8 +4821,8 @@
         </p:nvSpPr>
         <p:spPr>
           <a:xfrm>
-            <a:off x="6496455" y="2943907"/>
-            <a:ext cx="4857345" cy="1477328"/>
+            <a:off x="6391072" y="2684834"/>
+            <a:ext cx="4961107" cy="1323439"/>
           </a:xfrm>
           <a:prstGeom prst="rect">
             <a:avLst/>
@@ -4900,17 +4836,17 @@
           <a:lstStyle/>
           <a:p>
             <a:r>
-              <a:rPr lang="en-US" altLang="zh-CN" dirty="0"/>
-              <a:t>We can see that Yellow Cab is more popular among all age groups. Here “youth” means 18-25 years old; “young adults” means 26-40 adults; “middle aged” means 40-55 years old; “seniors” means 55-65 years old.</a:t>
-            </a:r>
-            <a:endParaRPr lang="zh-CN" altLang="en-US" dirty="0"/>
+              <a:rPr lang="en-US" altLang="zh-CN" sz="2000" dirty="0"/>
+              <a:t>Yellow Cab performs better in terms of average profit per km. This means that Yellow Cab has better cost management mechanism and thus greater capability to generate profit.</a:t>
+            </a:r>
+            <a:endParaRPr lang="zh-CN" altLang="en-US" sz="2000" dirty="0"/>
           </a:p>
         </p:txBody>
       </p:sp>
     </p:spTree>
     <p:extLst>
       <p:ext uri="{BB962C8B-B14F-4D97-AF65-F5344CB8AC3E}">
-        <p14:creationId xmlns:p14="http://schemas.microsoft.com/office/powerpoint/2010/main" val="881266773"/>
+        <p14:creationId xmlns:p14="http://schemas.microsoft.com/office/powerpoint/2010/main" val="1746344433"/>
       </p:ext>
     </p:extLst>
   </p:cSld>
@@ -4920,7 +4856,7 @@
 </p:sld>
 </file>
 
-<file path=ppt/slides/slide8.xml><?xml version="1.0" encoding="utf-8"?>
+<file path=ppt/slides/slide7.xml><?xml version="1.0" encoding="utf-8"?>
 <p:sld xmlns:a="http://schemas.openxmlformats.org/drawingml/2006/main" xmlns:r="http://schemas.openxmlformats.org/officeDocument/2006/relationships" xmlns:p="http://schemas.openxmlformats.org/presentationml/2006/main">
   <p:cSld>
     <p:spTree>
@@ -5053,7 +4989,7 @@
                 <a:latin typeface="Calibri" panose="020F0502020204030204" pitchFamily="34" charset="0"/>
                 <a:cs typeface="Calibri" panose="020F0502020204030204" pitchFamily="34" charset="0"/>
               </a:rPr>
-              <a:t>Seasonality</a:t>
+              <a:t>User-City Table</a:t>
             </a:r>
           </a:p>
         </p:txBody>
@@ -5063,7 +4999,7 @@
           <p:cNvPr id="8" name="内容占位符 7">
             <a:extLst>
               <a:ext uri="{FF2B5EF4-FFF2-40B4-BE49-F238E27FC236}">
-                <a16:creationId xmlns:a16="http://schemas.microsoft.com/office/drawing/2014/main" id="{618A49B4-E5D4-015A-222D-B83474112E35}"/>
+                <a16:creationId xmlns:a16="http://schemas.microsoft.com/office/drawing/2014/main" id="{0CF328B9-776D-FA58-1739-45D8F7CD079B}"/>
               </a:ext>
             </a:extLst>
           </p:cNvPr>
@@ -5088,17 +5024,17 @@
         </p:blipFill>
         <p:spPr>
           <a:xfrm>
-            <a:off x="838200" y="2581446"/>
-            <a:ext cx="5104762" cy="3530159"/>
+            <a:off x="409139" y="1524686"/>
+            <a:ext cx="5593555" cy="5128041"/>
           </a:xfrm>
         </p:spPr>
       </p:pic>
       <p:sp>
         <p:nvSpPr>
-          <p:cNvPr id="11" name="文本框 10">
-            <a:extLst>
-              <a:ext uri="{FF2B5EF4-FFF2-40B4-BE49-F238E27FC236}">
-                <a16:creationId xmlns:a16="http://schemas.microsoft.com/office/drawing/2014/main" id="{8857E9B7-B94C-6722-183E-6365BF47B8B1}"/>
+          <p:cNvPr id="12" name="文本框 11">
+            <a:extLst>
+              <a:ext uri="{FF2B5EF4-FFF2-40B4-BE49-F238E27FC236}">
+                <a16:creationId xmlns:a16="http://schemas.microsoft.com/office/drawing/2014/main" id="{8CF08BC7-943B-3172-FA62-62BD0EABA6EC}"/>
               </a:ext>
             </a:extLst>
           </p:cNvPr>
@@ -5107,8 +5043,8 @@
         </p:nvSpPr>
         <p:spPr>
           <a:xfrm>
-            <a:off x="6548501" y="3594271"/>
-            <a:ext cx="4459137" cy="1477328"/>
+            <a:off x="6469224" y="2549838"/>
+            <a:ext cx="4798979" cy="2554545"/>
           </a:xfrm>
           <a:prstGeom prst="rect">
             <a:avLst/>
@@ -5122,41 +5058,26 @@
           <a:lstStyle/>
           <a:p>
             <a:r>
-              <a:rPr lang="en-US" altLang="zh-CN" dirty="0"/>
-              <a:t>We can see that transaction number</a:t>
-            </a:r>
-            <a:r>
-              <a:rPr lang="zh-CN" altLang="en-US" dirty="0"/>
-              <a:t> </a:t>
-            </a:r>
-            <a:r>
-              <a:rPr lang="en-US" altLang="zh-CN" dirty="0"/>
-              <a:t>varies</a:t>
-            </a:r>
-            <a:r>
-              <a:rPr lang="zh-CN" altLang="en-US" dirty="0"/>
-              <a:t> </a:t>
-            </a:r>
-            <a:r>
-              <a:rPr lang="en-US" altLang="zh-CN" dirty="0"/>
-              <a:t>in</a:t>
-            </a:r>
-            <a:r>
-              <a:rPr lang="zh-CN" altLang="en-US" dirty="0"/>
-              <a:t> </a:t>
-            </a:r>
-            <a:r>
-              <a:rPr lang="en-US" altLang="zh-CN" dirty="0"/>
-              <a:t>different seasons. In Autumn there is greater demand for cabs while in spring there is less demand. This trend is reflected in both companies’ data.</a:t>
-            </a:r>
-            <a:endParaRPr lang="zh-CN" altLang="en-US" dirty="0"/>
+              <a:rPr lang="en-US" altLang="zh-CN" sz="2000" dirty="0"/>
+              <a:t>“Users” column is interpreted as the total number of cab users in the corresponding city. From the table we can see that both companies only account for a small portion of users in the cities. </a:t>
+            </a:r>
+          </a:p>
+          <a:p>
+            <a:endParaRPr lang="en-US" altLang="zh-CN" sz="2000" dirty="0"/>
+          </a:p>
+          <a:p>
+            <a:r>
+              <a:rPr lang="en-US" altLang="zh-CN" sz="2000" dirty="0"/>
+              <a:t>We should also note that neither of the companies had operation in San Francisco.</a:t>
+            </a:r>
+            <a:endParaRPr lang="zh-CN" altLang="en-US" sz="2000" dirty="0"/>
           </a:p>
         </p:txBody>
       </p:sp>
     </p:spTree>
     <p:extLst>
       <p:ext uri="{BB962C8B-B14F-4D97-AF65-F5344CB8AC3E}">
-        <p14:creationId xmlns:p14="http://schemas.microsoft.com/office/powerpoint/2010/main" val="3832471017"/>
+        <p14:creationId xmlns:p14="http://schemas.microsoft.com/office/powerpoint/2010/main" val="3170667158"/>
       </p:ext>
     </p:extLst>
   </p:cSld>
@@ -5166,7 +5087,7 @@
 </p:sld>
 </file>
 
-<file path=ppt/slides/slide9.xml><?xml version="1.0" encoding="utf-8"?>
+<file path=ppt/slides/slide8.xml><?xml version="1.0" encoding="utf-8"?>
 <p:sld xmlns:a="http://schemas.openxmlformats.org/drawingml/2006/main" xmlns:r="http://schemas.openxmlformats.org/officeDocument/2006/relationships" xmlns:p="http://schemas.openxmlformats.org/presentationml/2006/main">
   <p:cSld>
     <p:spTree>
@@ -5299,65 +5220,332 @@
                 <a:latin typeface="Calibri" panose="020F0502020204030204" pitchFamily="34" charset="0"/>
                 <a:cs typeface="Calibri" panose="020F0502020204030204" pitchFamily="34" charset="0"/>
               </a:rPr>
-              <a:t>Recommendations</a:t>
-            </a:r>
-          </a:p>
-        </p:txBody>
-      </p:sp>
-      <p:sp>
-        <p:nvSpPr>
+              <a:t>Transaction number in different age groups</a:t>
+            </a:r>
+          </a:p>
+        </p:txBody>
+      </p:sp>
+      <p:pic>
+        <p:nvPicPr>
           <p:cNvPr id="7" name="内容占位符 6">
             <a:extLst>
               <a:ext uri="{FF2B5EF4-FFF2-40B4-BE49-F238E27FC236}">
-                <a16:creationId xmlns:a16="http://schemas.microsoft.com/office/drawing/2014/main" id="{11427BD2-B1D6-D66C-39A4-831B30B1BD2C}"/>
-              </a:ext>
-            </a:extLst>
-          </p:cNvPr>
-          <p:cNvSpPr>
-            <a:spLocks noGrp="1"/>
-          </p:cNvSpPr>
+                <a16:creationId xmlns:a16="http://schemas.microsoft.com/office/drawing/2014/main" id="{2506A8E8-390B-40CA-C7EB-C6D7175A3488}"/>
+              </a:ext>
+            </a:extLst>
+          </p:cNvPr>
+          <p:cNvPicPr>
+            <a:picLocks noGrp="1" noChangeAspect="1"/>
+          </p:cNvPicPr>
           <p:nvPr>
             <p:ph idx="1"/>
           </p:nvPr>
-        </p:nvSpPr>
-        <p:spPr/>
-        <p:txBody>
-          <a:bodyPr/>
-          <a:lstStyle/>
-          <a:p>
-            <a:r>
-              <a:rPr lang="en-US" altLang="zh-CN" dirty="0"/>
-              <a:t>From the analysis in previous slides we can see that Yellow Cab performs better in every way. It had more transaction number, generated more profit per km, and was more popular among all age groups.</a:t>
-            </a:r>
-          </a:p>
-          <a:p>
-            <a:r>
-              <a:rPr lang="en-US" altLang="zh-CN" dirty="0"/>
-              <a:t>Therefore</a:t>
-            </a:r>
-            <a:r>
-              <a:rPr lang="en-US" altLang="zh-CN"/>
-              <a:t>, w</a:t>
-            </a:r>
-            <a:r>
-              <a:rPr lang="en-US" altLang="zh-CN" dirty="0"/>
-              <a:t>e</a:t>
-            </a:r>
-            <a:r>
-              <a:rPr lang="en-US" altLang="zh-CN"/>
-              <a:t> </a:t>
-            </a:r>
-            <a:r>
-              <a:rPr lang="en-US" altLang="zh-CN" dirty="0"/>
-              <a:t>recommend Yellow Cab for investment.</a:t>
-            </a:r>
+        </p:nvPicPr>
+        <p:blipFill>
+          <a:blip r:embed="rId2">
+            <a:extLst>
+              <a:ext uri="{28A0092B-C50C-407E-A947-70E740481C1C}">
+                <a14:useLocalDpi xmlns:a14="http://schemas.microsoft.com/office/drawing/2010/main" val="0"/>
+              </a:ext>
+            </a:extLst>
+          </a:blip>
+          <a:stretch>
+            <a:fillRect/>
+          </a:stretch>
+        </p:blipFill>
+        <p:spPr>
+          <a:xfrm>
+            <a:off x="838200" y="2478810"/>
+            <a:ext cx="5180952" cy="3530159"/>
+          </a:xfrm>
+        </p:spPr>
+      </p:pic>
+      <p:sp>
+        <p:nvSpPr>
+          <p:cNvPr id="10" name="文本框 9">
+            <a:extLst>
+              <a:ext uri="{FF2B5EF4-FFF2-40B4-BE49-F238E27FC236}">
+                <a16:creationId xmlns:a16="http://schemas.microsoft.com/office/drawing/2014/main" id="{E25505AA-9800-6C4C-F213-CB2C53807E06}"/>
+              </a:ext>
+            </a:extLst>
+          </p:cNvPr>
+          <p:cNvSpPr txBox="1"/>
+          <p:nvPr/>
+        </p:nvSpPr>
+        <p:spPr>
+          <a:xfrm>
+            <a:off x="6496455" y="2943907"/>
+            <a:ext cx="4857345" cy="1631216"/>
+          </a:xfrm>
+          <a:prstGeom prst="rect">
+            <a:avLst/>
+          </a:prstGeom>
+          <a:noFill/>
+        </p:spPr>
+        <p:txBody>
+          <a:bodyPr wrap="square" rtlCol="0">
+            <a:spAutoFit/>
+          </a:bodyPr>
+          <a:lstStyle/>
+          <a:p>
+            <a:r>
+              <a:rPr lang="en-US" altLang="zh-CN" sz="2000" dirty="0"/>
+              <a:t>We can see that Yellow Cab is more popular among all age groups. Here “youth” means 18-25 years old; “young adults” means 26-40 adults; “middle aged” means 40-55 years old; “seniors” means 55-65 years old.</a:t>
+            </a:r>
+            <a:endParaRPr lang="zh-CN" altLang="en-US" sz="2000" dirty="0"/>
           </a:p>
         </p:txBody>
       </p:sp>
     </p:spTree>
     <p:extLst>
       <p:ext uri="{BB962C8B-B14F-4D97-AF65-F5344CB8AC3E}">
-        <p14:creationId xmlns:p14="http://schemas.microsoft.com/office/powerpoint/2010/main" val="3930029949"/>
+        <p14:creationId xmlns:p14="http://schemas.microsoft.com/office/powerpoint/2010/main" val="881266773"/>
+      </p:ext>
+    </p:extLst>
+  </p:cSld>
+  <p:clrMapOvr>
+    <a:masterClrMapping/>
+  </p:clrMapOvr>
+</p:sld>
+</file>
+
+<file path=ppt/slides/slide9.xml><?xml version="1.0" encoding="utf-8"?>
+<p:sld xmlns:a="http://schemas.openxmlformats.org/drawingml/2006/main" xmlns:r="http://schemas.openxmlformats.org/officeDocument/2006/relationships" xmlns:p="http://schemas.openxmlformats.org/presentationml/2006/main">
+  <p:cSld>
+    <p:spTree>
+      <p:nvGrpSpPr>
+        <p:cNvPr id="1" name=""/>
+        <p:cNvGrpSpPr/>
+        <p:nvPr/>
+      </p:nvGrpSpPr>
+      <p:grpSpPr>
+        <a:xfrm>
+          <a:off x="0" y="0"/>
+          <a:ext cx="0" cy="0"/>
+          <a:chOff x="0" y="0"/>
+          <a:chExt cx="0" cy="0"/>
+        </a:xfrm>
+      </p:grpSpPr>
+      <p:sp>
+        <p:nvSpPr>
+          <p:cNvPr id="4" name="Rectangle 3">
+            <a:extLst>
+              <a:ext uri="{FF2B5EF4-FFF2-40B4-BE49-F238E27FC236}">
+                <a16:creationId xmlns:a16="http://schemas.microsoft.com/office/drawing/2014/main" id="{DD7B960C-F6E1-AE45-98A6-122DB2A97B5B}"/>
+              </a:ext>
+            </a:extLst>
+          </p:cNvPr>
+          <p:cNvSpPr/>
+          <p:nvPr/>
+        </p:nvSpPr>
+        <p:spPr>
+          <a:xfrm>
+            <a:off x="0" y="0"/>
+            <a:ext cx="12192000" cy="1371600"/>
+          </a:xfrm>
+          <a:prstGeom prst="rect">
+            <a:avLst/>
+          </a:prstGeom>
+          <a:solidFill>
+            <a:schemeClr val="bg2">
+              <a:lumMod val="25000"/>
+            </a:schemeClr>
+          </a:solidFill>
+        </p:spPr>
+        <p:style>
+          <a:lnRef idx="2">
+            <a:schemeClr val="accent1">
+              <a:shade val="50000"/>
+            </a:schemeClr>
+          </a:lnRef>
+          <a:fillRef idx="1">
+            <a:schemeClr val="accent1"/>
+          </a:fillRef>
+          <a:effectRef idx="0">
+            <a:schemeClr val="accent1"/>
+          </a:effectRef>
+          <a:fontRef idx="minor">
+            <a:schemeClr val="lt1"/>
+          </a:fontRef>
+        </p:style>
+        <p:txBody>
+          <a:bodyPr rtlCol="0" anchor="ctr"/>
+          <a:lstStyle/>
+          <a:p>
+            <a:pPr marL="0" marR="0" lvl="0" indent="0" algn="ctr" defTabSz="914400" rtl="0" eaLnBrk="1" fontAlgn="auto" latinLnBrk="0" hangingPunct="1">
+              <a:lnSpc>
+                <a:spcPct val="100000"/>
+              </a:lnSpc>
+              <a:spcBef>
+                <a:spcPts val="0"/>
+              </a:spcBef>
+              <a:spcAft>
+                <a:spcPts val="0"/>
+              </a:spcAft>
+              <a:buClrTx/>
+              <a:buSzTx/>
+              <a:buFontTx/>
+              <a:buNone/>
+              <a:tabLst/>
+              <a:defRPr/>
+            </a:pPr>
+            <a:endParaRPr kumimoji="0" lang="en-US" sz="1800" b="0" i="0" u="none" strike="noStrike" kern="1200" cap="none" spc="0" normalizeH="0" baseline="0" noProof="0">
+              <a:ln>
+                <a:noFill/>
+              </a:ln>
+              <a:solidFill>
+                <a:prstClr val="white"/>
+              </a:solidFill>
+              <a:effectLst/>
+              <a:uLnTx/>
+              <a:uFillTx/>
+              <a:latin typeface="Calibri" panose="020F0502020204030204"/>
+              <a:ea typeface="+mn-ea"/>
+              <a:cs typeface="+mn-cs"/>
+            </a:endParaRPr>
+          </a:p>
+        </p:txBody>
+      </p:sp>
+      <p:sp>
+        <p:nvSpPr>
+          <p:cNvPr id="6" name="Title 1">
+            <a:extLst>
+              <a:ext uri="{FF2B5EF4-FFF2-40B4-BE49-F238E27FC236}">
+                <a16:creationId xmlns:a16="http://schemas.microsoft.com/office/drawing/2014/main" id="{C526CBCB-8ADA-0E48-96D7-11EEE40222DD}"/>
+              </a:ext>
+            </a:extLst>
+          </p:cNvPr>
+          <p:cNvSpPr>
+            <a:spLocks noGrp="1"/>
+          </p:cNvSpPr>
+          <p:nvPr>
+            <p:ph type="title"/>
+          </p:nvPr>
+        </p:nvSpPr>
+        <p:spPr>
+          <a:xfrm>
+            <a:off x="838200" y="46037"/>
+            <a:ext cx="10515600" cy="1325563"/>
+          </a:xfrm>
+        </p:spPr>
+        <p:txBody>
+          <a:bodyPr>
+            <a:normAutofit/>
+          </a:bodyPr>
+          <a:lstStyle/>
+          <a:p>
+            <a:r>
+              <a:rPr lang="en-US" sz="3500" b="1" dirty="0">
+                <a:solidFill>
+                  <a:schemeClr val="accent2"/>
+                </a:solidFill>
+                <a:latin typeface="Calibri" panose="020F0502020204030204" pitchFamily="34" charset="0"/>
+                <a:cs typeface="Calibri" panose="020F0502020204030204" pitchFamily="34" charset="0"/>
+              </a:rPr>
+              <a:t>Seasonality</a:t>
+            </a:r>
+          </a:p>
+        </p:txBody>
+      </p:sp>
+      <p:pic>
+        <p:nvPicPr>
+          <p:cNvPr id="8" name="内容占位符 7">
+            <a:extLst>
+              <a:ext uri="{FF2B5EF4-FFF2-40B4-BE49-F238E27FC236}">
+                <a16:creationId xmlns:a16="http://schemas.microsoft.com/office/drawing/2014/main" id="{618A49B4-E5D4-015A-222D-B83474112E35}"/>
+              </a:ext>
+            </a:extLst>
+          </p:cNvPr>
+          <p:cNvPicPr>
+            <a:picLocks noGrp="1" noChangeAspect="1"/>
+          </p:cNvPicPr>
+          <p:nvPr>
+            <p:ph idx="1"/>
+          </p:nvPr>
+        </p:nvPicPr>
+        <p:blipFill>
+          <a:blip r:embed="rId2">
+            <a:extLst>
+              <a:ext uri="{28A0092B-C50C-407E-A947-70E740481C1C}">
+                <a14:useLocalDpi xmlns:a14="http://schemas.microsoft.com/office/drawing/2010/main" val="0"/>
+              </a:ext>
+            </a:extLst>
+          </a:blip>
+          <a:stretch>
+            <a:fillRect/>
+          </a:stretch>
+        </p:blipFill>
+        <p:spPr>
+          <a:xfrm>
+            <a:off x="838200" y="2581446"/>
+            <a:ext cx="5104762" cy="3530159"/>
+          </a:xfrm>
+        </p:spPr>
+      </p:pic>
+      <p:sp>
+        <p:nvSpPr>
+          <p:cNvPr id="11" name="文本框 10">
+            <a:extLst>
+              <a:ext uri="{FF2B5EF4-FFF2-40B4-BE49-F238E27FC236}">
+                <a16:creationId xmlns:a16="http://schemas.microsoft.com/office/drawing/2014/main" id="{8857E9B7-B94C-6722-183E-6365BF47B8B1}"/>
+              </a:ext>
+            </a:extLst>
+          </p:cNvPr>
+          <p:cNvSpPr txBox="1"/>
+          <p:nvPr/>
+        </p:nvSpPr>
+        <p:spPr>
+          <a:xfrm>
+            <a:off x="6548501" y="3594271"/>
+            <a:ext cx="4459137" cy="1692771"/>
+          </a:xfrm>
+          <a:prstGeom prst="rect">
+            <a:avLst/>
+          </a:prstGeom>
+          <a:noFill/>
+        </p:spPr>
+        <p:txBody>
+          <a:bodyPr wrap="square" rtlCol="0">
+            <a:spAutoFit/>
+          </a:bodyPr>
+          <a:lstStyle/>
+          <a:p>
+            <a:r>
+              <a:rPr lang="en-US" altLang="zh-CN" sz="2000" dirty="0"/>
+              <a:t>We can see that transaction number</a:t>
+            </a:r>
+            <a:r>
+              <a:rPr lang="zh-CN" altLang="en-US" sz="2000" dirty="0"/>
+              <a:t> </a:t>
+            </a:r>
+            <a:r>
+              <a:rPr lang="en-US" altLang="zh-CN" sz="2000" dirty="0"/>
+              <a:t>varies</a:t>
+            </a:r>
+            <a:r>
+              <a:rPr lang="zh-CN" altLang="en-US" sz="2000" dirty="0"/>
+              <a:t> </a:t>
+            </a:r>
+            <a:r>
+              <a:rPr lang="en-US" altLang="zh-CN" sz="2000" dirty="0"/>
+              <a:t>in</a:t>
+            </a:r>
+            <a:r>
+              <a:rPr lang="zh-CN" altLang="en-US" sz="2000" dirty="0"/>
+              <a:t> </a:t>
+            </a:r>
+            <a:r>
+              <a:rPr lang="en-US" altLang="zh-CN" sz="2000" dirty="0"/>
+              <a:t>different seasons. In Autumn there is greater demand for cabs while in spring there is less demand. This trend is reflected in both companies’ data.</a:t>
+            </a:r>
+            <a:endParaRPr lang="zh-CN" altLang="en-US" sz="2000" dirty="0"/>
+          </a:p>
+        </p:txBody>
+      </p:sp>
+    </p:spTree>
+    <p:extLst>
+      <p:ext uri="{BB962C8B-B14F-4D97-AF65-F5344CB8AC3E}">
+        <p14:creationId xmlns:p14="http://schemas.microsoft.com/office/powerpoint/2010/main" val="3832471017"/>
       </p:ext>
     </p:extLst>
   </p:cSld>

</xml_diff>